<commit_message>
minor: fix quotation in Dockerfile
</commit_message>
<xml_diff>
--- a/docker/05_Dockerfiles.pptx
+++ b/docker/05_Dockerfiles.pptx
@@ -16521,7 +16521,7 @@
                 <a:latin typeface="Courier New" panose="02070309020205020404" pitchFamily="49" charset="0"/>
                 <a:cs typeface="Courier New" panose="02070309020205020404" pitchFamily="49" charset="0"/>
               </a:rPr>
-              <a:t>ENTRYPOINT [ /</a:t>
+              <a:t>ENTRYPOINT [ "/</a:t>
             </a:r>
             <a:r>
               <a:rPr lang="en-US" sz="1400" b="1" dirty="0" err="1">
@@ -16549,7 +16549,7 @@
                 <a:latin typeface="Courier New" panose="02070309020205020404" pitchFamily="49" charset="0"/>
                 <a:cs typeface="Courier New" panose="02070309020205020404" pitchFamily="49" charset="0"/>
               </a:rPr>
-              <a:t> ]</a:t>
+              <a:t>" ]</a:t>
             </a:r>
           </a:p>
           <a:p>

</xml_diff>